<commit_message>
Update .ipynb, README, Report, and Presentation
</commit_message>
<xml_diff>
--- a/Capstone Projects/Capstone_2_WalmartSalesForecasting/Project_Documents/Walmart Sales Forecasting Presentation.pptx
+++ b/Capstone Projects/Capstone_2_WalmartSalesForecasting/Project_Documents/Walmart Sales Forecasting Presentation.pptx
@@ -17,6 +17,7 @@
     <p:sldId id="267" r:id="rId11"/>
     <p:sldId id="268" r:id="rId12"/>
     <p:sldId id="269" r:id="rId13"/>
+    <p:sldId id="271" r:id="rId14"/>
   </p:sldIdLst>
   <p:sldSz cx="12192000" cy="6858000"/>
   <p:notesSz cx="6858000" cy="9144000"/>
@@ -270,7 +271,7 @@
           <a:p>
             <a:fld id="{ED291B17-9318-49DB-B28B-6E5994AE9581}" type="datetime1">
               <a:rPr lang="en-US" smtClean="0"/>
-              <a:t>8/16/2021</a:t>
+              <a:t>8/17/2021</a:t>
             </a:fld>
             <a:endParaRPr lang="en-US" dirty="0"/>
           </a:p>
@@ -468,7 +469,7 @@
           <a:p>
             <a:fld id="{2CED4963-E985-44C4-B8C4-FDD613B7C2F8}" type="datetime1">
               <a:rPr lang="en-US" smtClean="0"/>
-              <a:t>8/16/2021</a:t>
+              <a:t>8/17/2021</a:t>
             </a:fld>
             <a:endParaRPr lang="en-US" dirty="0"/>
           </a:p>
@@ -676,7 +677,7 @@
           <a:p>
             <a:fld id="{ED291B17-9318-49DB-B28B-6E5994AE9581}" type="datetime1">
               <a:rPr lang="en-US" smtClean="0"/>
-              <a:t>8/16/2021</a:t>
+              <a:t>8/17/2021</a:t>
             </a:fld>
             <a:endParaRPr lang="en-US" dirty="0"/>
           </a:p>
@@ -874,7 +875,7 @@
           <a:p>
             <a:fld id="{78DD82B9-B8EE-4375-B6FF-88FA6ABB15D9}" type="datetime1">
               <a:rPr lang="en-US" smtClean="0"/>
-              <a:t>8/16/2021</a:t>
+              <a:t>8/17/2021</a:t>
             </a:fld>
             <a:endParaRPr lang="en-US" dirty="0"/>
           </a:p>
@@ -1149,7 +1150,7 @@
           <a:p>
             <a:fld id="{B2497495-0637-405E-AE64-5CC7506D51F5}" type="datetime1">
               <a:rPr lang="en-US" smtClean="0"/>
-              <a:t>8/16/2021</a:t>
+              <a:t>8/17/2021</a:t>
             </a:fld>
             <a:endParaRPr lang="en-US" dirty="0"/>
           </a:p>
@@ -1414,7 +1415,7 @@
           <a:p>
             <a:fld id="{7BFFD690-9426-415D-8B65-26881E07B2D4}" type="datetime1">
               <a:rPr lang="en-US" smtClean="0"/>
-              <a:t>8/16/2021</a:t>
+              <a:t>8/17/2021</a:t>
             </a:fld>
             <a:endParaRPr lang="en-US" dirty="0"/>
           </a:p>
@@ -1826,7 +1827,7 @@
           <a:p>
             <a:fld id="{04C4989A-474C-40DE-95B9-011C28B71673}" type="datetime1">
               <a:rPr lang="en-US" smtClean="0"/>
-              <a:t>8/16/2021</a:t>
+              <a:t>8/17/2021</a:t>
             </a:fld>
             <a:endParaRPr lang="en-US" dirty="0"/>
           </a:p>
@@ -1967,7 +1968,7 @@
           <a:p>
             <a:fld id="{5DB4ED54-5B5E-4A04-93D3-5772E3CE3818}" type="datetime1">
               <a:rPr lang="en-US" smtClean="0"/>
-              <a:t>8/16/2021</a:t>
+              <a:t>8/17/2021</a:t>
             </a:fld>
             <a:endParaRPr lang="en-US" dirty="0"/>
           </a:p>
@@ -2080,7 +2081,7 @@
           <a:p>
             <a:fld id="{4EDE50D6-574B-40AF-946F-D52A04ADE379}" type="datetime1">
               <a:rPr lang="en-US" smtClean="0"/>
-              <a:t>8/16/2021</a:t>
+              <a:t>8/17/2021</a:t>
             </a:fld>
             <a:endParaRPr lang="en-US" dirty="0"/>
           </a:p>
@@ -2391,7 +2392,7 @@
           <a:p>
             <a:fld id="{D82884F1-FFEA-405F-9602-3DCA865EDA4E}" type="datetime1">
               <a:rPr lang="en-US" smtClean="0"/>
-              <a:t>8/16/2021</a:t>
+              <a:t>8/17/2021</a:t>
             </a:fld>
             <a:endParaRPr lang="en-US" dirty="0"/>
           </a:p>
@@ -2680,7 +2681,7 @@
           <a:p>
             <a:fld id="{7E18DB4A-8810-4A10-AD5C-D5E2C667F5B3}" type="datetime1">
               <a:rPr lang="en-US" smtClean="0"/>
-              <a:t>8/16/2021</a:t>
+              <a:t>8/17/2021</a:t>
             </a:fld>
             <a:endParaRPr lang="en-US" dirty="0"/>
           </a:p>
@@ -2925,7 +2926,7 @@
           <a:p>
             <a:fld id="{ED291B17-9318-49DB-B28B-6E5994AE9581}" type="datetime1">
               <a:rPr lang="en-US" smtClean="0"/>
-              <a:t>8/16/2021</a:t>
+              <a:t>8/17/2021</a:t>
             </a:fld>
             <a:endParaRPr lang="en-US" dirty="0"/>
           </a:p>
@@ -3945,6 +3946,103 @@
 </p:sld>
 </file>
 
+<file path=ppt/slides/slide13.xml><?xml version="1.0" encoding="utf-8"?>
+<p:sld xmlns:a="http://schemas.openxmlformats.org/drawingml/2006/main" xmlns:r="http://schemas.openxmlformats.org/officeDocument/2006/relationships" xmlns:p="http://schemas.openxmlformats.org/presentationml/2006/main">
+  <p:cSld>
+    <p:spTree>
+      <p:nvGrpSpPr>
+        <p:cNvPr id="1" name=""/>
+        <p:cNvGrpSpPr/>
+        <p:nvPr/>
+      </p:nvGrpSpPr>
+      <p:grpSpPr>
+        <a:xfrm>
+          <a:off x="0" y="0"/>
+          <a:ext cx="0" cy="0"/>
+          <a:chOff x="0" y="0"/>
+          <a:chExt cx="0" cy="0"/>
+        </a:xfrm>
+      </p:grpSpPr>
+      <p:sp>
+        <p:nvSpPr>
+          <p:cNvPr id="2" name="Title 1">
+            <a:extLst>
+              <a:ext uri="{FF2B5EF4-FFF2-40B4-BE49-F238E27FC236}">
+                <a16:creationId xmlns:a16="http://schemas.microsoft.com/office/drawing/2014/main" id="{1E0C3789-B28F-4A01-9417-5E23AED7ACFA}"/>
+              </a:ext>
+            </a:extLst>
+          </p:cNvPr>
+          <p:cNvSpPr>
+            <a:spLocks noGrp="1"/>
+          </p:cNvSpPr>
+          <p:nvPr>
+            <p:ph type="title"/>
+          </p:nvPr>
+        </p:nvSpPr>
+        <p:spPr/>
+        <p:txBody>
+          <a:bodyPr/>
+          <a:lstStyle/>
+          <a:p>
+            <a:r>
+              <a:rPr lang="en-US" dirty="0"/>
+              <a:t>How to Use the Findings</a:t>
+            </a:r>
+          </a:p>
+        </p:txBody>
+      </p:sp>
+      <p:sp>
+        <p:nvSpPr>
+          <p:cNvPr id="3" name="Content Placeholder 2">
+            <a:extLst>
+              <a:ext uri="{FF2B5EF4-FFF2-40B4-BE49-F238E27FC236}">
+                <a16:creationId xmlns:a16="http://schemas.microsoft.com/office/drawing/2014/main" id="{2CB06BED-0227-43E5-82E8-D9BDE4CC494C}"/>
+              </a:ext>
+            </a:extLst>
+          </p:cNvPr>
+          <p:cNvSpPr>
+            <a:spLocks noGrp="1"/>
+          </p:cNvSpPr>
+          <p:nvPr>
+            <p:ph idx="1"/>
+          </p:nvPr>
+        </p:nvSpPr>
+        <p:spPr/>
+        <p:txBody>
+          <a:bodyPr anchor="ctr">
+            <a:normAutofit/>
+          </a:bodyPr>
+          <a:lstStyle/>
+          <a:p>
+            <a:pPr marL="0" indent="0" algn="ctr">
+              <a:buNone/>
+            </a:pPr>
+            <a:r>
+              <a:rPr lang="en-US" sz="4400" dirty="0">
+                <a:effectLst/>
+                <a:latin typeface="Garamond" panose="02020404030301010803" pitchFamily="18" charset="0"/>
+                <a:ea typeface="Calibri" panose="020F0502020204030204" pitchFamily="34" charset="0"/>
+                <a:cs typeface="Times New Roman" panose="02020603050405020304" pitchFamily="18" charset="0"/>
+              </a:rPr>
+              <a:t>Use this model to forecast and prepare Walmart’s supply operations based on the  predictions of demand</a:t>
+            </a:r>
+            <a:endParaRPr lang="en-US" sz="4400" dirty="0"/>
+          </a:p>
+        </p:txBody>
+      </p:sp>
+    </p:spTree>
+    <p:extLst>
+      <p:ext uri="{BB962C8B-B14F-4D97-AF65-F5344CB8AC3E}">
+        <p14:creationId xmlns:p14="http://schemas.microsoft.com/office/powerpoint/2010/main" val="929638107"/>
+      </p:ext>
+    </p:extLst>
+  </p:cSld>
+  <p:clrMapOvr>
+    <a:masterClrMapping/>
+  </p:clrMapOvr>
+</p:sld>
+</file>
+
 <file path=ppt/slides/slide2.xml><?xml version="1.0" encoding="utf-8"?>
 <p:sld xmlns:a="http://schemas.openxmlformats.org/drawingml/2006/main" xmlns:r="http://schemas.openxmlformats.org/officeDocument/2006/relationships" xmlns:p="http://schemas.openxmlformats.org/presentationml/2006/main">
   <p:cSld>

</xml_diff>